<commit_message>
fixes image path for powerpoint test
</commit_message>
<xml_diff>
--- a/Templates/PresentationCopy.pptx
+++ b/Templates/PresentationCopy.pptx
@@ -6,10 +6,10 @@
   </p:sldMasterIdLst>
   <p:sldIdLst>
     <p:sldId id="256" r:id="rId2"/>
-    <p:sldId id="257" r:id="R076440c5d9a543cd"/>
-    <p:sldId id="258" r:id="R39364397037a4fce"/>
-    <p:sldId id="259" r:id="Ra88a0729e56e4a26"/>
-    <p:sldId id="260" r:id="R76bf7efb44174c3d"/>
+    <p:sldId id="257" r:id="R7035375ed91d4a20"/>
+    <p:sldId id="258" r:id="Rad1af780749f4718"/>
+    <p:sldId id="259" r:id="R20e916f853ee494e"/>
+    <p:sldId id="260" r:id="Rbd12dcbdc5114181"/>
   </p:sldIdLst>
   <p:sldSz cx="12192000" cy="6858000"/>
   <p:notesSz cx="6858000" cy="9144000"/>

</xml_diff>